<commit_message>
Modificata presentazione ultima frase
</commit_message>
<xml_diff>
--- a/documentazione/BankRobbery_Presentation.pptx
+++ b/documentazione/BankRobbery_Presentation.pptx
@@ -4489,21 +4489,21 @@
           <a:p>
             <a:pPr algn="r"/>
             <a:r>
-              <a:rPr lang="it-IT" sz="2400" b="1">
+              <a:rPr lang="it-IT" sz="2400" b="1" dirty="0">
                 <a:solidFill>
                   <a:srgbClr val="FFC000"/>
                 </a:solidFill>
               </a:rPr>
               <a:t>Attacco Informatico</a:t>
             </a:r>
-            <a:endParaRPr lang="it-IT" b="1">
+            <a:endParaRPr lang="it-IT" b="1" dirty="0">
               <a:solidFill>
                 <a:srgbClr val="FFC000"/>
               </a:solidFill>
             </a:endParaRPr>
           </a:p>
           <a:p>
-            <a:endParaRPr lang="it-IT" b="1"/>
+            <a:endParaRPr lang="it-IT" b="1" dirty="0"/>
           </a:p>
           <a:p>
             <a:pPr marL="800100" lvl="1" indent="-342900">
@@ -4511,7 +4511,7 @@
               <a:buChar char="o"/>
             </a:pPr>
             <a:r>
-              <a:rPr lang="it-IT" sz="2000"/>
+              <a:rPr lang="it-IT" sz="2000" dirty="0"/>
               <a:t>Basso rischio di individuazione</a:t>
             </a:r>
           </a:p>
@@ -4521,7 +4521,7 @@
               <a:buChar char="o"/>
             </a:pPr>
             <a:r>
-              <a:rPr lang="it-IT" sz="2000"/>
+              <a:rPr lang="it-IT" sz="2000" dirty="0"/>
               <a:t>Basso guadagno</a:t>
             </a:r>
           </a:p>
@@ -4531,7 +4531,7 @@
               <a:buChar char="o"/>
             </a:pPr>
             <a:r>
-              <a:rPr lang="it-IT" sz="2000"/>
+              <a:rPr lang="it-IT" sz="2000" dirty="0"/>
               <a:t>Alti tempi e costi di esecuzione</a:t>
             </a:r>
           </a:p>
@@ -4541,8 +4541,16 @@
               <a:buChar char="o"/>
             </a:pPr>
             <a:r>
+              <a:rPr lang="it-IT" sz="2000" dirty="0"/>
+              <a:t>Può essere effettuato </a:t>
+            </a:r>
+            <a:r>
               <a:rPr lang="it-IT" sz="2000"/>
-              <a:t>Può essere effettuato direttamente alla banca o ai suoi dipendenti e clienti</a:t>
+              <a:t>direttamente contro la banca o contro i </a:t>
+            </a:r>
+            <a:r>
+              <a:rPr lang="it-IT" sz="2000" dirty="0"/>
+              <a:t>suoi dipendenti e clienti</a:t>
             </a:r>
           </a:p>
         </p:txBody>
@@ -6487,7 +6495,7 @@
                   <a:schemeClr val="bg1"/>
                 </a:solidFill>
               </a:rPr>
-              <a:t>La possibilità di interazione tra gli attacchi fisico e informatico rende più vulnerabile la banca</a:t>
+              <a:t>La possibilità di interazione tra l’attacco fisico e informatico rende più vulnerabile la banca</a:t>
             </a:r>
           </a:p>
         </p:txBody>

</xml_diff>